<commit_message>
paper: correct arch diagram.
</commit_message>
<xml_diff>
--- a/doc/vldb15/ermia-arch.pptx
+++ b/doc/vldb15/ermia-arch.pptx
@@ -243,7 +243,7 @@
           <a:p>
             <a:fld id="{325DCDBF-67E5-4D0C-B428-D1D882A4FACE}" type="datetimeFigureOut">
               <a:rPr lang="en-US" smtClean="0"/>
-              <a:t>2/27/2015</a:t>
+              <a:t>2/28/2015</a:t>
             </a:fld>
             <a:endParaRPr lang="en-US"/>
           </a:p>
@@ -413,7 +413,7 @@
           <a:p>
             <a:fld id="{325DCDBF-67E5-4D0C-B428-D1D882A4FACE}" type="datetimeFigureOut">
               <a:rPr lang="en-US" smtClean="0"/>
-              <a:t>2/27/2015</a:t>
+              <a:t>2/28/2015</a:t>
             </a:fld>
             <a:endParaRPr lang="en-US"/>
           </a:p>
@@ -593,7 +593,7 @@
           <a:p>
             <a:fld id="{325DCDBF-67E5-4D0C-B428-D1D882A4FACE}" type="datetimeFigureOut">
               <a:rPr lang="en-US" smtClean="0"/>
-              <a:t>2/27/2015</a:t>
+              <a:t>2/28/2015</a:t>
             </a:fld>
             <a:endParaRPr lang="en-US"/>
           </a:p>
@@ -763,7 +763,7 @@
           <a:p>
             <a:fld id="{325DCDBF-67E5-4D0C-B428-D1D882A4FACE}" type="datetimeFigureOut">
               <a:rPr lang="en-US" smtClean="0"/>
-              <a:t>2/27/2015</a:t>
+              <a:t>2/28/2015</a:t>
             </a:fld>
             <a:endParaRPr lang="en-US"/>
           </a:p>
@@ -1007,7 +1007,7 @@
           <a:p>
             <a:fld id="{325DCDBF-67E5-4D0C-B428-D1D882A4FACE}" type="datetimeFigureOut">
               <a:rPr lang="en-US" smtClean="0"/>
-              <a:t>2/27/2015</a:t>
+              <a:t>2/28/2015</a:t>
             </a:fld>
             <a:endParaRPr lang="en-US"/>
           </a:p>
@@ -1239,7 +1239,7 @@
           <a:p>
             <a:fld id="{325DCDBF-67E5-4D0C-B428-D1D882A4FACE}" type="datetimeFigureOut">
               <a:rPr lang="en-US" smtClean="0"/>
-              <a:t>2/27/2015</a:t>
+              <a:t>2/28/2015</a:t>
             </a:fld>
             <a:endParaRPr lang="en-US"/>
           </a:p>
@@ -1606,7 +1606,7 @@
           <a:p>
             <a:fld id="{325DCDBF-67E5-4D0C-B428-D1D882A4FACE}" type="datetimeFigureOut">
               <a:rPr lang="en-US" smtClean="0"/>
-              <a:t>2/27/2015</a:t>
+              <a:t>2/28/2015</a:t>
             </a:fld>
             <a:endParaRPr lang="en-US"/>
           </a:p>
@@ -1724,7 +1724,7 @@
           <a:p>
             <a:fld id="{325DCDBF-67E5-4D0C-B428-D1D882A4FACE}" type="datetimeFigureOut">
               <a:rPr lang="en-US" smtClean="0"/>
-              <a:t>2/27/2015</a:t>
+              <a:t>2/28/2015</a:t>
             </a:fld>
             <a:endParaRPr lang="en-US"/>
           </a:p>
@@ -1819,7 +1819,7 @@
           <a:p>
             <a:fld id="{325DCDBF-67E5-4D0C-B428-D1D882A4FACE}" type="datetimeFigureOut">
               <a:rPr lang="en-US" smtClean="0"/>
-              <a:t>2/27/2015</a:t>
+              <a:t>2/28/2015</a:t>
             </a:fld>
             <a:endParaRPr lang="en-US"/>
           </a:p>
@@ -2096,7 +2096,7 @@
           <a:p>
             <a:fld id="{325DCDBF-67E5-4D0C-B428-D1D882A4FACE}" type="datetimeFigureOut">
               <a:rPr lang="en-US" smtClean="0"/>
-              <a:t>2/27/2015</a:t>
+              <a:t>2/28/2015</a:t>
             </a:fld>
             <a:endParaRPr lang="en-US"/>
           </a:p>
@@ -2353,7 +2353,7 @@
           <a:p>
             <a:fld id="{325DCDBF-67E5-4D0C-B428-D1D882A4FACE}" type="datetimeFigureOut">
               <a:rPr lang="en-US" smtClean="0"/>
-              <a:t>2/27/2015</a:t>
+              <a:t>2/28/2015</a:t>
             </a:fld>
             <a:endParaRPr lang="en-US"/>
           </a:p>
@@ -2566,7 +2566,7 @@
           <a:p>
             <a:fld id="{325DCDBF-67E5-4D0C-B428-D1D882A4FACE}" type="datetimeFigureOut">
               <a:rPr lang="en-US" smtClean="0"/>
-              <a:t>2/27/2015</a:t>
+              <a:t>2/28/2015</a:t>
             </a:fld>
             <a:endParaRPr lang="en-US"/>
           </a:p>
@@ -3909,8 +3909,8 @@
         </p:nvSpPr>
         <p:spPr>
           <a:xfrm>
-            <a:off x="220828" y="2961724"/>
-            <a:ext cx="1717002" cy="365760"/>
+            <a:off x="220828" y="2902411"/>
+            <a:ext cx="1670116" cy="509404"/>
           </a:xfrm>
           <a:prstGeom prst="rect">
             <a:avLst/>
@@ -3950,7 +3950,14 @@
             <a:pPr algn="ctr"/>
             <a:r>
               <a:rPr lang="en-US" sz="1600" dirty="0" smtClean="0"/>
-              <a:t>Central Log buffer</a:t>
+              <a:t>Centralized</a:t>
+            </a:r>
+          </a:p>
+          <a:p>
+            <a:pPr algn="ctr"/>
+            <a:r>
+              <a:rPr lang="en-US" sz="1600" dirty="0" smtClean="0"/>
+              <a:t>log buffer</a:t>
             </a:r>
             <a:endParaRPr lang="en-US" sz="1600" dirty="0"/>
           </a:p>
@@ -5242,7 +5249,7 @@
         </p:nvSpPr>
         <p:spPr>
           <a:xfrm>
-            <a:off x="685462" y="2349725"/>
+            <a:off x="685462" y="2305335"/>
             <a:ext cx="1016692" cy="408897"/>
           </a:xfrm>
           <a:prstGeom prst="rect">
@@ -5429,7 +5436,7 @@
         </p:nvSpPr>
         <p:spPr>
           <a:xfrm rot="5400000">
-            <a:off x="385735" y="2426634"/>
+            <a:off x="385735" y="2382244"/>
             <a:ext cx="475131" cy="274400"/>
           </a:xfrm>
           <a:prstGeom prst="rightArrow">

</xml_diff>